<commit_message>
Update Project Proposal Slides.pptx
</commit_message>
<xml_diff>
--- a/IB516 Analytical Workflows/Project Proposal Slides.pptx
+++ b/IB516 Analytical Workflows/Project Proposal Slides.pptx
@@ -3486,13 +3486,8 @@
           <a:p>
             <a:r>
               <a:rPr lang="en-US" dirty="0"/>
-              <a:t>I am in this course to learn best practices for establishing reproducible data </a:t>
-            </a:r>
-            <a:r>
-              <a:rPr lang="en-US"/>
-              <a:t>workflow pipelines</a:t>
-            </a:r>
-            <a:endParaRPr lang="en-US" dirty="0"/>
+              <a:t>I am in the beginning stages of establishing an eDNA metabarcoding pipeline, and am in this class to learn how to create a manageable and reproducible project structure</a:t>
+            </a:r>
           </a:p>
         </p:txBody>
       </p:sp>

</xml_diff>